<commit_message>
added SGN workshop slide
</commit_message>
<xml_diff>
--- a/deck/city-specific/dms-workshop-BKK.pptx
+++ b/deck/city-specific/dms-workshop-BKK.pptx
@@ -345,7 +345,7 @@
             <a:fld id="{0B25AC41-3BEC-9247-8322-91B80C013F2D}" type="datetimeFigureOut">
               <a:rPr lang="en-US" smtClean="0"/>
               <a:pPr/>
-              <a:t>10/26/17</a:t>
+              <a:t>11/7/17</a:t>
             </a:fld>
             <a:endParaRPr lang="en-US" dirty="0"/>
           </a:p>
@@ -4830,8 +4830,8 @@
         </p:nvSpPr>
         <p:spPr>
           <a:xfrm>
-            <a:off x="3445727" y="635619"/>
-            <a:ext cx="2876108" cy="738664"/>
+            <a:off x="3476240" y="97712"/>
+            <a:ext cx="4564070" cy="1384995"/>
           </a:xfrm>
           <a:prstGeom prst="rect">
             <a:avLst/>
@@ -4853,30 +4853,116 @@
               <a:t>SSID: </a:t>
             </a:r>
             <a:r>
-              <a:rPr lang="en-US" sz="2100" b="1" dirty="0">
+              <a:rPr lang="en-US" sz="2100" b="1" dirty="0" smtClean="0">
                 <a:latin typeface="Amazon Ember Light" charset="0"/>
                 <a:ea typeface="Amazon Ember Light" charset="0"/>
                 <a:cs typeface="Amazon Ember Light" charset="0"/>
               </a:rPr>
-              <a:t>AWS Workshop</a:t>
-            </a:r>
-          </a:p>
-          <a:p>
+              <a:t>S31-Ballroom</a:t>
+            </a:r>
+            <a:endParaRPr lang="en-US" sz="2100" b="1" dirty="0">
+              <a:latin typeface="Amazon Ember Light" charset="0"/>
+              <a:ea typeface="Amazon Ember Light" charset="0"/>
+              <a:cs typeface="Amazon Ember Light" charset="0"/>
+            </a:endParaRPr>
+          </a:p>
+          <a:p>
+            <a:r>
+              <a:rPr lang="en-US" sz="2100" dirty="0" smtClean="0">
+                <a:latin typeface="Amazon Ember Light" charset="0"/>
+                <a:ea typeface="Amazon Ember Light" charset="0"/>
+                <a:cs typeface="Amazon Ember Light" charset="0"/>
+              </a:rPr>
+              <a:t>Username/Password</a:t>
+            </a:r>
             <a:r>
               <a:rPr lang="en-US" sz="2100" dirty="0">
                 <a:latin typeface="Amazon Ember Light" charset="0"/>
                 <a:ea typeface="Amazon Ember Light" charset="0"/>
                 <a:cs typeface="Amazon Ember Light" charset="0"/>
               </a:rPr>
-              <a:t>Password: </a:t>
-            </a:r>
-            <a:r>
-              <a:rPr lang="de-DE" sz="2100" b="1" dirty="0">
+              <a:t>: </a:t>
+            </a:r>
+            <a:r>
+              <a:rPr lang="de-DE" sz="2100" b="1" dirty="0" smtClean="0">
                 <a:latin typeface="Amazon Ember Light" charset="0"/>
                 <a:ea typeface="Amazon Ember Light" charset="0"/>
                 <a:cs typeface="Amazon Ember Light" charset="0"/>
               </a:rPr>
-              <a:t>@AWS2017</a:t>
+              <a:t>{</a:t>
+            </a:r>
+            <a:r>
+              <a:rPr lang="de-DE" sz="2100" b="1" dirty="0" err="1" smtClean="0">
+                <a:latin typeface="Amazon Ember Light" charset="0"/>
+                <a:ea typeface="Amazon Ember Light" charset="0"/>
+                <a:cs typeface="Amazon Ember Light" charset="0"/>
+              </a:rPr>
+              <a:t>ask</a:t>
+            </a:r>
+            <a:r>
+              <a:rPr lang="de-DE" sz="2100" b="1" dirty="0" smtClean="0">
+                <a:latin typeface="Amazon Ember Light" charset="0"/>
+                <a:ea typeface="Amazon Ember Light" charset="0"/>
+                <a:cs typeface="Amazon Ember Light" charset="0"/>
+              </a:rPr>
+              <a:t> AWS </a:t>
+            </a:r>
+            <a:r>
+              <a:rPr lang="de-DE" sz="2100" b="1" dirty="0" err="1" smtClean="0">
+                <a:latin typeface="Amazon Ember Light" charset="0"/>
+                <a:ea typeface="Amazon Ember Light" charset="0"/>
+                <a:cs typeface="Amazon Ember Light" charset="0"/>
+              </a:rPr>
+              <a:t>staff</a:t>
+            </a:r>
+            <a:r>
+              <a:rPr lang="de-DE" sz="2100" b="1" dirty="0" smtClean="0">
+                <a:latin typeface="Amazon Ember Light" charset="0"/>
+                <a:ea typeface="Amazon Ember Light" charset="0"/>
+                <a:cs typeface="Amazon Ember Light" charset="0"/>
+              </a:rPr>
+              <a:t>}</a:t>
+            </a:r>
+          </a:p>
+          <a:p>
+            <a:r>
+              <a:rPr lang="de-DE" sz="2100" b="1" dirty="0" smtClean="0">
+                <a:latin typeface="Amazon Ember Light" charset="0"/>
+                <a:ea typeface="Amazon Ember Light" charset="0"/>
+                <a:cs typeface="Amazon Ember Light" charset="0"/>
+              </a:rPr>
+              <a:t>User: </a:t>
+            </a:r>
+            <a:r>
+              <a:rPr lang="de-DE" sz="2100" b="1" dirty="0" err="1" smtClean="0">
+                <a:latin typeface="Amazon Ember Light" charset="0"/>
+                <a:ea typeface="Amazon Ember Light" charset="0"/>
+                <a:cs typeface="Amazon Ember Light" charset="0"/>
+              </a:rPr>
+              <a:t>shirkeydev@gmail.com</a:t>
+            </a:r>
+            <a:r>
+              <a:rPr lang="de-DE" sz="2100" b="1" dirty="0" smtClean="0">
+                <a:latin typeface="Amazon Ember Light" charset="0"/>
+                <a:ea typeface="Amazon Ember Light" charset="0"/>
+                <a:cs typeface="Amazon Ember Light" charset="0"/>
+              </a:rPr>
+              <a:t/>
+            </a:r>
+            <a:br>
+              <a:rPr lang="de-DE" sz="2100" b="1" dirty="0" smtClean="0">
+                <a:latin typeface="Amazon Ember Light" charset="0"/>
+                <a:ea typeface="Amazon Ember Light" charset="0"/>
+                <a:cs typeface="Amazon Ember Light" charset="0"/>
+              </a:rPr>
+            </a:br>
+            <a:r>
+              <a:rPr lang="de-DE" sz="2100" b="1" dirty="0" smtClean="0">
+                <a:latin typeface="Amazon Ember Light" charset="0"/>
+                <a:ea typeface="Amazon Ember Light" charset="0"/>
+                <a:cs typeface="Amazon Ember Light" charset="0"/>
+              </a:rPr>
+              <a:t>Password: W0rksh0p</a:t>
             </a:r>
             <a:endParaRPr lang="en-US" sz="2100" b="1" dirty="0">
               <a:latin typeface="Amazon Ember Light" charset="0"/>
@@ -4941,7 +5027,7 @@
         </p:blipFill>
         <p:spPr>
           <a:xfrm>
-            <a:off x="2769260" y="1498012"/>
+            <a:off x="2382761" y="1648841"/>
             <a:ext cx="1160171" cy="1852628"/>
           </a:xfrm>
           <a:prstGeom prst="rect">
@@ -4949,9 +5035,50 @@
           </a:prstGeom>
         </p:spPr>
       </p:pic>
+      <p:sp>
+        <p:nvSpPr>
+          <p:cNvPr id="17" name="Rectangle 16"/>
+          <p:cNvSpPr/>
+          <p:nvPr/>
+        </p:nvSpPr>
+        <p:spPr>
+          <a:xfrm>
+            <a:off x="2360590" y="3581754"/>
+            <a:ext cx="1115650" cy="715581"/>
+          </a:xfrm>
+          <a:prstGeom prst="rect">
+            <a:avLst/>
+          </a:prstGeom>
+        </p:spPr>
+        <p:txBody>
+          <a:bodyPr wrap="square">
+            <a:spAutoFit/>
+          </a:bodyPr>
+          <a:lstStyle/>
+          <a:p>
+            <a:pPr algn="ctr"/>
+            <a:r>
+              <a:rPr lang="en-US" sz="1350">
+                <a:solidFill>
+                  <a:srgbClr val="555555"/>
+                </a:solidFill>
+                <a:latin typeface="Amazon Ember Light" charset="0"/>
+                <a:ea typeface="Amazon Ember Light" charset="0"/>
+                <a:cs typeface="Amazon Ember Light" charset="0"/>
+              </a:rPr>
+              <a:t>Solutions Architect ASEAN</a:t>
+            </a:r>
+            <a:endParaRPr lang="en-US" sz="1350">
+              <a:latin typeface="Amazon Ember Light" charset="0"/>
+              <a:ea typeface="Amazon Ember Light" charset="0"/>
+              <a:cs typeface="Amazon Ember Light" charset="0"/>
+            </a:endParaRPr>
+          </a:p>
+        </p:txBody>
+      </p:sp>
       <p:pic>
         <p:nvPicPr>
-          <p:cNvPr id="7" name="Picture 6"/>
+          <p:cNvPr id="3" name="Picture 2"/>
           <p:cNvPicPr>
             <a:picLocks noChangeAspect="1"/>
           </p:cNvPicPr>
@@ -4971,8 +5098,8 @@
         </p:blipFill>
         <p:spPr>
           <a:xfrm>
-            <a:off x="495690" y="1491109"/>
-            <a:ext cx="1099429" cy="1840481"/>
+            <a:off x="4804823" y="1681246"/>
+            <a:ext cx="1130513" cy="1861660"/>
           </a:xfrm>
           <a:prstGeom prst="rect">
             <a:avLst/>
@@ -4981,7 +5108,7 @@
       </p:pic>
       <p:pic>
         <p:nvPicPr>
-          <p:cNvPr id="8" name="Picture 7"/>
+          <p:cNvPr id="20" name="Picture 19"/>
           <p:cNvPicPr>
             <a:picLocks noChangeAspect="1"/>
           </p:cNvPicPr>
@@ -5001,8 +5128,8 @@
         </p:blipFill>
         <p:spPr>
           <a:xfrm>
-            <a:off x="1617290" y="1498012"/>
-            <a:ext cx="1129799" cy="1852628"/>
+            <a:off x="3610332" y="1681246"/>
+            <a:ext cx="1127091" cy="1820223"/>
           </a:xfrm>
           <a:prstGeom prst="rect">
             <a:avLst/>
@@ -5011,7 +5138,7 @@
       </p:pic>
       <p:pic>
         <p:nvPicPr>
-          <p:cNvPr id="9" name="Picture 8"/>
+          <p:cNvPr id="21" name="Picture 20"/>
           <p:cNvPicPr>
             <a:picLocks noChangeAspect="1"/>
           </p:cNvPicPr>
@@ -5031,114 +5158,65 @@
         </p:blipFill>
         <p:spPr>
           <a:xfrm>
-            <a:off x="3929431" y="1509332"/>
-            <a:ext cx="1111577" cy="1822258"/>
+            <a:off x="5999314" y="1681246"/>
+            <a:ext cx="1127350" cy="1846416"/>
           </a:xfrm>
           <a:prstGeom prst="rect">
             <a:avLst/>
           </a:prstGeom>
         </p:spPr>
       </p:pic>
-      <p:pic>
-        <p:nvPicPr>
-          <p:cNvPr id="10" name="Picture 9"/>
-          <p:cNvPicPr>
-            <a:picLocks noChangeAspect="1"/>
-          </p:cNvPicPr>
+      <p:sp>
+        <p:nvSpPr>
+          <p:cNvPr id="22" name="Rectangle 21"/>
+          <p:cNvSpPr/>
           <p:nvPr/>
-        </p:nvPicPr>
-        <p:blipFill>
-          <a:blip r:embed="rId7">
-            <a:extLst>
-              <a:ext uri="{28A0092B-C50C-407E-A947-70E740481C1C}">
-                <a14:useLocalDpi xmlns:a14="http://schemas.microsoft.com/office/drawing/2010/main" val="0"/>
-              </a:ext>
-            </a:extLst>
-          </a:blip>
-          <a:stretch>
-            <a:fillRect/>
-          </a:stretch>
-        </p:blipFill>
-        <p:spPr>
-          <a:xfrm>
-            <a:off x="5089601" y="1516234"/>
-            <a:ext cx="1154097" cy="1834406"/>
+        </p:nvSpPr>
+        <p:spPr>
+          <a:xfrm>
+            <a:off x="5935336" y="3581754"/>
+            <a:ext cx="1169526" cy="523220"/>
           </a:xfrm>
           <a:prstGeom prst="rect">
             <a:avLst/>
           </a:prstGeom>
         </p:spPr>
-      </p:pic>
-      <p:pic>
-        <p:nvPicPr>
-          <p:cNvPr id="11" name="Picture 10"/>
-          <p:cNvPicPr>
-            <a:picLocks noChangeAspect="1"/>
-          </p:cNvPicPr>
-          <p:nvPr/>
-        </p:nvPicPr>
-        <p:blipFill>
-          <a:blip r:embed="rId8">
-            <a:extLst>
-              <a:ext uri="{28A0092B-C50C-407E-A947-70E740481C1C}">
-                <a14:useLocalDpi xmlns:a14="http://schemas.microsoft.com/office/drawing/2010/main" val="0"/>
-              </a:ext>
-            </a:extLst>
-          </a:blip>
-          <a:stretch>
-            <a:fillRect/>
-          </a:stretch>
-        </p:blipFill>
-        <p:spPr>
-          <a:xfrm>
-            <a:off x="6243699" y="1518030"/>
-            <a:ext cx="1123726" cy="1804035"/>
-          </a:xfrm>
-          <a:prstGeom prst="rect">
-            <a:avLst/>
-          </a:prstGeom>
-        </p:spPr>
-      </p:pic>
-      <p:pic>
-        <p:nvPicPr>
-          <p:cNvPr id="12" name="Picture 11"/>
-          <p:cNvPicPr>
-            <a:picLocks noChangeAspect="1"/>
-          </p:cNvPicPr>
-          <p:nvPr/>
-        </p:nvPicPr>
-        <p:blipFill>
-          <a:blip r:embed="rId9">
-            <a:extLst>
-              <a:ext uri="{28A0092B-C50C-407E-A947-70E740481C1C}">
-                <a14:useLocalDpi xmlns:a14="http://schemas.microsoft.com/office/drawing/2010/main" val="0"/>
-              </a:ext>
-            </a:extLst>
-          </a:blip>
-          <a:stretch>
-            <a:fillRect/>
-          </a:stretch>
-        </p:blipFill>
-        <p:spPr>
-          <a:xfrm>
-            <a:off x="7416018" y="1516234"/>
-            <a:ext cx="1105503" cy="1834406"/>
-          </a:xfrm>
-          <a:prstGeom prst="rect">
-            <a:avLst/>
-          </a:prstGeom>
-        </p:spPr>
-      </p:pic>
-      <p:sp>
-        <p:nvSpPr>
-          <p:cNvPr id="13" name="Rectangle 12"/>
+        <p:txBody>
+          <a:bodyPr wrap="square">
+            <a:spAutoFit/>
+          </a:bodyPr>
+          <a:lstStyle/>
+          <a:p>
+            <a:pPr algn="ctr"/>
+            <a:r>
+              <a:rPr lang="en-US" sz="1400" dirty="0">
+                <a:solidFill>
+                  <a:srgbClr val="555555"/>
+                </a:solidFill>
+                <a:latin typeface="Amazon Ember Light" charset="0"/>
+                <a:ea typeface="Amazon Ember Light" charset="0"/>
+                <a:cs typeface="Amazon Ember Light" charset="0"/>
+              </a:rPr>
+              <a:t>Inside Sales, Thailand</a:t>
+            </a:r>
+            <a:endParaRPr lang="en-US" sz="1400" dirty="0">
+              <a:latin typeface="Amazon Ember Light" charset="0"/>
+              <a:ea typeface="Amazon Ember Light" charset="0"/>
+              <a:cs typeface="Amazon Ember Light" charset="0"/>
+            </a:endParaRPr>
+          </a:p>
+        </p:txBody>
+      </p:sp>
+      <p:sp>
+        <p:nvSpPr>
+          <p:cNvPr id="23" name="Rectangle 22"/>
           <p:cNvSpPr/>
           <p:nvPr/>
         </p:nvSpPr>
         <p:spPr>
           <a:xfrm>
-            <a:off x="495690" y="3421341"/>
-            <a:ext cx="1055619" cy="715581"/>
+            <a:off x="3610332" y="3585374"/>
+            <a:ext cx="1115650" cy="715581"/>
           </a:xfrm>
           <a:prstGeom prst="rect">
             <a:avLst/>
@@ -5160,7 +5238,18 @@
                 <a:ea typeface="Amazon Ember Light" charset="0"/>
                 <a:cs typeface="Amazon Ember Light" charset="0"/>
               </a:rPr>
-              <a:t>Enterprise Sales, Philippines</a:t>
+              <a:t>Solutions Architect </a:t>
+            </a:r>
+            <a:r>
+              <a:rPr lang="en-US" sz="1350" dirty="0" smtClean="0">
+                <a:solidFill>
+                  <a:srgbClr val="555555"/>
+                </a:solidFill>
+                <a:latin typeface="Amazon Ember Light" charset="0"/>
+                <a:ea typeface="Amazon Ember Light" charset="0"/>
+                <a:cs typeface="Amazon Ember Light" charset="0"/>
+              </a:rPr>
+              <a:t>Thailand</a:t>
             </a:r>
             <a:endParaRPr lang="en-US" sz="1350" dirty="0">
               <a:latin typeface="Amazon Ember Light" charset="0"/>
@@ -5172,14 +5261,14 @@
       </p:sp>
       <p:sp>
         <p:nvSpPr>
-          <p:cNvPr id="14" name="Rectangle 13"/>
+          <p:cNvPr id="24" name="Rectangle 23"/>
           <p:cNvSpPr/>
           <p:nvPr/>
         </p:nvSpPr>
         <p:spPr>
           <a:xfrm>
-            <a:off x="1617290" y="3421342"/>
-            <a:ext cx="1129799" cy="715581"/>
+            <a:off x="4812254" y="3581754"/>
+            <a:ext cx="1115650" cy="715581"/>
           </a:xfrm>
           <a:prstGeom prst="rect">
             <a:avLst/>
@@ -5201,40 +5290,10 @@
                 <a:ea typeface="Amazon Ember Light" charset="0"/>
                 <a:cs typeface="Amazon Ember Light" charset="0"/>
               </a:rPr>
-              <a:t>Marketing Specialist - SG</a:t>
-            </a:r>
-            <a:endParaRPr lang="en-US" sz="1350" dirty="0">
-              <a:latin typeface="Amazon Ember Light" charset="0"/>
-              <a:ea typeface="Amazon Ember Light" charset="0"/>
-              <a:cs typeface="Amazon Ember Light" charset="0"/>
-            </a:endParaRPr>
-          </a:p>
-        </p:txBody>
-      </p:sp>
-      <p:sp>
-        <p:nvSpPr>
-          <p:cNvPr id="15" name="Rectangle 14"/>
-          <p:cNvSpPr/>
-          <p:nvPr/>
-        </p:nvSpPr>
-        <p:spPr>
-          <a:xfrm>
-            <a:off x="3862738" y="3443852"/>
-            <a:ext cx="1160171" cy="715581"/>
-          </a:xfrm>
-          <a:prstGeom prst="rect">
-            <a:avLst/>
-          </a:prstGeom>
-        </p:spPr>
-        <p:txBody>
-          <a:bodyPr wrap="square">
-            <a:spAutoFit/>
-          </a:bodyPr>
-          <a:lstStyle/>
-          <a:p>
-            <a:pPr algn="ctr"/>
-            <a:r>
-              <a:rPr lang="en-US" sz="1350">
+              <a:t>Solutions Architect </a:t>
+            </a:r>
+            <a:r>
+              <a:rPr lang="en-US" sz="1350" dirty="0" smtClean="0">
                 <a:solidFill>
                   <a:srgbClr val="555555"/>
                 </a:solidFill>
@@ -5242,184 +5301,9 @@
                 <a:ea typeface="Amazon Ember Light" charset="0"/>
                 <a:cs typeface="Amazon Ember Light" charset="0"/>
               </a:rPr>
-              <a:t>Cloud Architecture Consultant</a:t>
-            </a:r>
-            <a:endParaRPr lang="en-US" sz="1350">
-              <a:latin typeface="Amazon Ember Light" charset="0"/>
-              <a:ea typeface="Amazon Ember Light" charset="0"/>
-              <a:cs typeface="Amazon Ember Light" charset="0"/>
-            </a:endParaRPr>
-          </a:p>
-        </p:txBody>
-      </p:sp>
-      <p:sp>
-        <p:nvSpPr>
-          <p:cNvPr id="16" name="Rectangle 15"/>
-          <p:cNvSpPr/>
-          <p:nvPr/>
-        </p:nvSpPr>
-        <p:spPr>
-          <a:xfrm>
-            <a:off x="5041009" y="3443852"/>
-            <a:ext cx="1237742" cy="715581"/>
-          </a:xfrm>
-          <a:prstGeom prst="rect">
-            <a:avLst/>
-          </a:prstGeom>
-        </p:spPr>
-        <p:txBody>
-          <a:bodyPr wrap="square">
-            <a:spAutoFit/>
-          </a:bodyPr>
-          <a:lstStyle/>
-          <a:p>
-            <a:pPr algn="ctr"/>
-            <a:r>
-              <a:rPr lang="en-US" sz="1350" dirty="0">
-                <a:solidFill>
-                  <a:srgbClr val="555555"/>
-                </a:solidFill>
-                <a:latin typeface="Amazon Ember Light" charset="0"/>
-                <a:ea typeface="Amazon Ember Light" charset="0"/>
-                <a:cs typeface="Amazon Ember Light" charset="0"/>
-              </a:rPr>
-              <a:t>Solutions Architect</a:t>
-            </a:r>
-            <a:r>
-              <a:rPr lang="en-US" sz="1350">
-                <a:solidFill>
-                  <a:srgbClr val="555555"/>
-                </a:solidFill>
-                <a:latin typeface="Amazon Ember Light" charset="0"/>
-                <a:ea typeface="Amazon Ember Light" charset="0"/>
-                <a:cs typeface="Amazon Ember Light" charset="0"/>
-              </a:rPr>
-              <a:t>, Philippines</a:t>
+              <a:t>Thailand</a:t>
             </a:r>
             <a:endParaRPr lang="en-US" sz="1350" dirty="0">
-              <a:latin typeface="Amazon Ember Light" charset="0"/>
-              <a:ea typeface="Amazon Ember Light" charset="0"/>
-              <a:cs typeface="Amazon Ember Light" charset="0"/>
-            </a:endParaRPr>
-          </a:p>
-        </p:txBody>
-      </p:sp>
-      <p:sp>
-        <p:nvSpPr>
-          <p:cNvPr id="17" name="Rectangle 16"/>
-          <p:cNvSpPr/>
-          <p:nvPr/>
-        </p:nvSpPr>
-        <p:spPr>
-          <a:xfrm>
-            <a:off x="2747089" y="3430925"/>
-            <a:ext cx="1115650" cy="715581"/>
-          </a:xfrm>
-          <a:prstGeom prst="rect">
-            <a:avLst/>
-          </a:prstGeom>
-        </p:spPr>
-        <p:txBody>
-          <a:bodyPr wrap="square">
-            <a:spAutoFit/>
-          </a:bodyPr>
-          <a:lstStyle/>
-          <a:p>
-            <a:pPr algn="ctr"/>
-            <a:r>
-              <a:rPr lang="en-US" sz="1350">
-                <a:solidFill>
-                  <a:srgbClr val="555555"/>
-                </a:solidFill>
-                <a:latin typeface="Amazon Ember Light" charset="0"/>
-                <a:ea typeface="Amazon Ember Light" charset="0"/>
-                <a:cs typeface="Amazon Ember Light" charset="0"/>
-              </a:rPr>
-              <a:t>Solutions Architect ASEAN</a:t>
-            </a:r>
-            <a:endParaRPr lang="en-US" sz="1350">
-              <a:latin typeface="Amazon Ember Light" charset="0"/>
-              <a:ea typeface="Amazon Ember Light" charset="0"/>
-              <a:cs typeface="Amazon Ember Light" charset="0"/>
-            </a:endParaRPr>
-          </a:p>
-        </p:txBody>
-      </p:sp>
-      <p:sp>
-        <p:nvSpPr>
-          <p:cNvPr id="18" name="Rectangle 17"/>
-          <p:cNvSpPr/>
-          <p:nvPr/>
-        </p:nvSpPr>
-        <p:spPr>
-          <a:xfrm>
-            <a:off x="7416018" y="3421342"/>
-            <a:ext cx="1047071" cy="715581"/>
-          </a:xfrm>
-          <a:prstGeom prst="rect">
-            <a:avLst/>
-          </a:prstGeom>
-        </p:spPr>
-        <p:txBody>
-          <a:bodyPr wrap="square">
-            <a:spAutoFit/>
-          </a:bodyPr>
-          <a:lstStyle/>
-          <a:p>
-            <a:pPr algn="ctr"/>
-            <a:r>
-              <a:rPr lang="en-US" sz="1350">
-                <a:solidFill>
-                  <a:srgbClr val="555555"/>
-                </a:solidFill>
-                <a:latin typeface="Amazon Ember Light" charset="0"/>
-                <a:ea typeface="Amazon Ember Light" charset="0"/>
-                <a:cs typeface="Amazon Ember Light" charset="0"/>
-              </a:rPr>
-              <a:t>Inside Sales, Philippines</a:t>
-            </a:r>
-            <a:endParaRPr lang="en-US" sz="1350">
-              <a:latin typeface="Amazon Ember Light" charset="0"/>
-              <a:ea typeface="Amazon Ember Light" charset="0"/>
-              <a:cs typeface="Amazon Ember Light" charset="0"/>
-            </a:endParaRPr>
-          </a:p>
-        </p:txBody>
-      </p:sp>
-      <p:sp>
-        <p:nvSpPr>
-          <p:cNvPr id="19" name="Rectangle 18"/>
-          <p:cNvSpPr/>
-          <p:nvPr/>
-        </p:nvSpPr>
-        <p:spPr>
-          <a:xfrm>
-            <a:off x="6234387" y="3443852"/>
-            <a:ext cx="1115650" cy="715581"/>
-          </a:xfrm>
-          <a:prstGeom prst="rect">
-            <a:avLst/>
-          </a:prstGeom>
-        </p:spPr>
-        <p:txBody>
-          <a:bodyPr wrap="square">
-            <a:spAutoFit/>
-          </a:bodyPr>
-          <a:lstStyle/>
-          <a:p>
-            <a:pPr algn="ctr"/>
-            <a:r>
-              <a:rPr lang="en-US" sz="1350">
-                <a:solidFill>
-                  <a:srgbClr val="555555"/>
-                </a:solidFill>
-                <a:latin typeface="Amazon Ember Light" charset="0"/>
-                <a:ea typeface="Amazon Ember Light" charset="0"/>
-                <a:cs typeface="Amazon Ember Light" charset="0"/>
-              </a:rPr>
-              <a:t>Solutions Architect ASEAN</a:t>
-            </a:r>
-            <a:endParaRPr lang="en-US" sz="1350">
               <a:latin typeface="Amazon Ember Light" charset="0"/>
               <a:ea typeface="Amazon Ember Light" charset="0"/>
               <a:cs typeface="Amazon Ember Light" charset="0"/>
@@ -5437,6 +5321,13 @@
   <p:clrMapOvr>
     <a:masterClrMapping/>
   </p:clrMapOvr>
+  <p:timing>
+    <p:tnLst>
+      <p:par>
+        <p:cTn id="1" dur="indefinite" restart="never" nodeType="tmRoot"/>
+      </p:par>
+    </p:tnLst>
+  </p:timing>
 </p:sld>
 </file>
 

</xml_diff>